<commit_message>
Review lecture 2 (studying for final)
</commit_message>
<xml_diff>
--- a/Lectures/Lecture 02_Big O.pptx
+++ b/Lectures/Lecture 02_Big O.pptx
@@ -2381,7 +2381,7 @@
             <a:fld id="{23A271A1-F6D6-438B-A432-4747EE7ECD40}" type="datetimeFigureOut">
               <a:rPr lang="en-US" smtClean="0"/>
               <a:pPr eaLnBrk="1" latinLnBrk="0" hangingPunct="1"/>
-              <a:t>2/28/24</a:t>
+              <a:t>4/29/24</a:t>
             </a:fld>
             <a:endParaRPr lang="en-US" dirty="0"/>
           </a:p>
@@ -2548,7 +2548,7 @@
             <a:fld id="{23A271A1-F6D6-438B-A432-4747EE7ECD40}" type="datetimeFigureOut">
               <a:rPr lang="en-US" smtClean="0"/>
               <a:pPr eaLnBrk="1" latinLnBrk="0" hangingPunct="1"/>
-              <a:t>2/28/24</a:t>
+              <a:t>4/29/24</a:t>
             </a:fld>
             <a:endParaRPr lang="en-US"/>
           </a:p>
@@ -3834,7 +3834,7 @@
           </a:ln>
           <a:extLst>
             <a:ext uri="{C572A759-6A51-4108-AA02-DFA0A04FC94B}">
-              <ma14:wrappingTextBoxFlag xmlns="" xmlns:m="http://schemas.openxmlformats.org/officeDocument/2006/math" xmlns:a14="http://schemas.microsoft.com/office/drawing/2010/main" xmlns:ma14="http://schemas.microsoft.com/office/mac/drawingml/2011/main" val="1"/>
+              <ma14:wrappingTextBoxFlag xmlns:ma14="http://schemas.microsoft.com/office/mac/drawingml/2011/main" xmlns:a14="http://schemas.microsoft.com/office/drawing/2010/main" xmlns:m="http://schemas.openxmlformats.org/officeDocument/2006/math" xmlns="" val="1"/>
             </a:ext>
           </a:extLst>
         </p:spPr>
@@ -3871,7 +3871,7 @@
           </a:ln>
           <a:extLst>
             <a:ext uri="{C572A759-6A51-4108-AA02-DFA0A04FC94B}">
-              <ma14:wrappingTextBoxFlag xmlns="" xmlns:m="http://schemas.openxmlformats.org/officeDocument/2006/math" xmlns:a14="http://schemas.microsoft.com/office/drawing/2010/main" xmlns:ma14="http://schemas.microsoft.com/office/mac/drawingml/2011/main" val="1"/>
+              <ma14:wrappingTextBoxFlag xmlns:ma14="http://schemas.microsoft.com/office/mac/drawingml/2011/main" xmlns:a14="http://schemas.microsoft.com/office/drawing/2010/main" xmlns:m="http://schemas.openxmlformats.org/officeDocument/2006/math" xmlns="" val="1"/>
             </a:ext>
           </a:extLst>
         </p:spPr>
@@ -9351,7 +9351,7 @@
         <p:spPr>
           <a:xfrm>
             <a:off x="4498428" y="3228568"/>
-            <a:ext cx="1991443" cy="369332"/>
+            <a:ext cx="3350597" cy="461665"/>
           </a:xfrm>
           <a:prstGeom prst="rect">
             <a:avLst/>
@@ -9366,7 +9366,7 @@
           <a:p>
             <a:r>
               <a:rPr lang="en-US" dirty="0"/>
-              <a:t>by definition of sum</a:t>
+              <a:t>by the definition of sum</a:t>
             </a:r>
           </a:p>
         </p:txBody>
@@ -10299,7 +10299,7 @@
             </a:pPr>
             <a:r>
               <a:rPr lang="en-US" sz="2400" dirty="0"/>
-              <a:t>State what you’re trying to prove</a:t>
+              <a:t>State what you’re trying to prove.</a:t>
             </a:r>
             <a:br>
               <a:rPr lang="en-US" sz="2400" dirty="0"/>
@@ -12279,7 +12279,12 @@
             <p:ph sz="quarter" idx="1"/>
           </p:nvPr>
         </p:nvSpPr>
-        <p:spPr/>
+        <p:spPr>
+          <a:xfrm>
+            <a:off x="495300" y="1755388"/>
+            <a:ext cx="8153400" cy="2291576"/>
+          </a:xfrm>
+        </p:spPr>
         <p:txBody>
           <a:bodyPr/>
           <a:lstStyle/>
@@ -12288,8 +12293,12 @@
               <a:buNone/>
             </a:pPr>
             <a:r>
+              <a:rPr lang="en-US" sz="2400" b="1" dirty="0"/>
+              <a:t>Weak</a:t>
+            </a:r>
+            <a:r>
               <a:rPr lang="en-US" sz="2400" dirty="0"/>
-              <a:t>Weak: inductive hypothesis only assumes it holds for some step (e.g., </a:t>
+              <a:t>: inductive hypothesis only assumes it holds for some step (e.g., </a:t>
             </a:r>
             <a:r>
               <a:rPr lang="en-US" sz="2400" i="1" dirty="0"/>
@@ -12297,7 +12306,7 @@
             </a:r>
             <a:r>
               <a:rPr lang="en-US" sz="2400" dirty="0"/>
-              <a:t>th step)</a:t>
+              <a:t>th step).</a:t>
             </a:r>
           </a:p>
           <a:p>
@@ -12311,12 +12320,16 @@
               <a:buNone/>
             </a:pPr>
             <a:r>
+              <a:rPr lang="en-US" sz="2400" b="1" dirty="0"/>
+              <a:t>Strong</a:t>
+            </a:r>
+            <a:r>
               <a:rPr lang="en-US" sz="2400" dirty="0"/>
-              <a:t>Strong: inductive hypothesis assumes it holds for all steps from the base case up to </a:t>
+              <a:t>: inductive hypothesis assumes it holds for all steps from the base case up to </a:t>
             </a:r>
             <a:r>
               <a:rPr lang="en-US" sz="2400" i="1" dirty="0"/>
-              <a:t>k</a:t>
+              <a:t>k.</a:t>
             </a:r>
           </a:p>
         </p:txBody>
@@ -12579,8 +12592,8 @@
         </p:blipFill>
         <p:spPr>
           <a:xfrm>
-            <a:off x="3030701" y="2820544"/>
-            <a:ext cx="2245491" cy="608456"/>
+            <a:off x="2668153" y="2909752"/>
+            <a:ext cx="2842215" cy="770149"/>
           </a:xfrm>
           <a:prstGeom prst="rect">
             <a:avLst/>
@@ -13032,7 +13045,7 @@
           </a:ln>
           <a:extLst>
             <a:ext uri="{C572A759-6A51-4108-AA02-DFA0A04FC94B}">
-              <ma14:wrappingTextBoxFlag xmlns="" xmlns:m="http://schemas.openxmlformats.org/officeDocument/2006/math" xmlns:a14="http://schemas.microsoft.com/office/drawing/2010/main" xmlns:ma14="http://schemas.microsoft.com/office/mac/drawingml/2011/main" val="1"/>
+              <ma14:wrappingTextBoxFlag xmlns:ma14="http://schemas.microsoft.com/office/mac/drawingml/2011/main" xmlns:a14="http://schemas.microsoft.com/office/drawing/2010/main" xmlns:m="http://schemas.openxmlformats.org/officeDocument/2006/math" xmlns="" val="1"/>
             </a:ext>
           </a:extLst>
         </p:spPr>
@@ -13160,7 +13173,7 @@
           </a:ln>
           <a:extLst>
             <a:ext uri="{C572A759-6A51-4108-AA02-DFA0A04FC94B}">
-              <ma14:wrappingTextBoxFlag xmlns="" xmlns:m="http://schemas.openxmlformats.org/officeDocument/2006/math" xmlns:a14="http://schemas.microsoft.com/office/drawing/2010/main" xmlns:ma14="http://schemas.microsoft.com/office/mac/drawingml/2011/main" val="1"/>
+              <ma14:wrappingTextBoxFlag xmlns:ma14="http://schemas.microsoft.com/office/mac/drawingml/2011/main" xmlns:a14="http://schemas.microsoft.com/office/drawing/2010/main" xmlns:m="http://schemas.openxmlformats.org/officeDocument/2006/math" xmlns="" val="1"/>
             </a:ext>
           </a:extLst>
         </p:spPr>
@@ -13276,7 +13289,7 @@
         </p:nvSpPr>
         <p:spPr>
           <a:xfrm>
-            <a:off x="350519" y="1752600"/>
+            <a:off x="350519" y="1331771"/>
             <a:ext cx="8061962" cy="2743483"/>
           </a:xfrm>
           <a:prstGeom prst="rect">
@@ -13287,7 +13300,7 @@
           </a:ln>
           <a:extLst>
             <a:ext uri="{C572A759-6A51-4108-AA02-DFA0A04FC94B}">
-              <ma14:wrappingTextBoxFlag xmlns="" xmlns:m="http://schemas.openxmlformats.org/officeDocument/2006/math" xmlns:a14="http://schemas.microsoft.com/office/drawing/2010/main" xmlns:ma14="http://schemas.microsoft.com/office/mac/drawingml/2011/main" val="1"/>
+              <ma14:wrappingTextBoxFlag xmlns:ma14="http://schemas.microsoft.com/office/mac/drawingml/2011/main" xmlns:a14="http://schemas.microsoft.com/office/drawing/2010/main" xmlns:m="http://schemas.openxmlformats.org/officeDocument/2006/math" xmlns="" val="1"/>
             </a:ext>
           </a:extLst>
         </p:spPr>
@@ -13301,26 +13314,27 @@
               <a:defRPr sz="3600" b="1" baseline="30000"/>
             </a:pPr>
             <a:r>
+              <a:rPr dirty="0"/>
               <a:t>Loop invariant</a:t>
             </a:r>
             <a:r>
-              <a:rPr b="0"/>
+              <a:rPr b="0" dirty="0"/>
               <a:t>: A statement about a loop that is true </a:t>
             </a:r>
             <a:r>
-              <a:rPr b="0" i="1"/>
+              <a:rPr b="0" i="1" dirty="0"/>
               <a:t>before</a:t>
             </a:r>
             <a:r>
-              <a:rPr b="0"/>
+              <a:rPr b="0" dirty="0"/>
               <a:t> the loop begins and </a:t>
             </a:r>
             <a:r>
-              <a:rPr b="0" i="1"/>
+              <a:rPr b="0" i="1" dirty="0"/>
               <a:t>after each iteration </a:t>
             </a:r>
             <a:r>
-              <a:rPr b="0"/>
+              <a:rPr b="0" dirty="0"/>
               <a:t>of the loop.</a:t>
             </a:r>
           </a:p>
@@ -13328,13 +13342,14 @@
             <a:pPr defTabSz="457200">
               <a:defRPr sz="3600" baseline="30000"/>
             </a:pPr>
-            <a:endParaRPr b="0"/>
+            <a:endParaRPr b="0" dirty="0"/>
           </a:p>
           <a:p>
             <a:pPr defTabSz="457200">
               <a:defRPr sz="3600" baseline="30000"/>
             </a:pPr>
             <a:r>
+              <a:rPr dirty="0"/>
               <a:t>Upon termination of the loop, the invariant should help you show something useful about the algorithm.</a:t>
             </a:r>
           </a:p>
@@ -13359,7 +13374,7 @@
           </a:ln>
           <a:extLst>
             <a:ext uri="{C572A759-6A51-4108-AA02-DFA0A04FC94B}">
-              <ma14:wrappingTextBoxFlag xmlns="" xmlns:m="http://schemas.openxmlformats.org/officeDocument/2006/math" xmlns:a14="http://schemas.microsoft.com/office/drawing/2010/main" xmlns:ma14="http://schemas.microsoft.com/office/mac/drawingml/2011/main" val="1"/>
+              <ma14:wrappingTextBoxFlag xmlns:ma14="http://schemas.microsoft.com/office/mac/drawingml/2011/main" xmlns:a14="http://schemas.microsoft.com/office/drawing/2010/main" xmlns:m="http://schemas.openxmlformats.org/officeDocument/2006/math" xmlns="" val="1"/>
             </a:ext>
           </a:extLst>
         </p:spPr>
@@ -13599,7 +13614,7 @@
           </a:ln>
           <a:extLst>
             <a:ext uri="{C572A759-6A51-4108-AA02-DFA0A04FC94B}">
-              <ma14:wrappingTextBoxFlag xmlns="" xmlns:m="http://schemas.openxmlformats.org/officeDocument/2006/math" xmlns:a14="http://schemas.microsoft.com/office/drawing/2010/main" xmlns:ma14="http://schemas.microsoft.com/office/mac/drawingml/2011/main" val="1"/>
+              <ma14:wrappingTextBoxFlag xmlns:ma14="http://schemas.microsoft.com/office/mac/drawingml/2011/main" xmlns:a14="http://schemas.microsoft.com/office/drawing/2010/main" xmlns:m="http://schemas.openxmlformats.org/officeDocument/2006/math" xmlns="" val="1"/>
             </a:ext>
           </a:extLst>
         </p:spPr>
@@ -13685,7 +13700,7 @@
           </a:ln>
           <a:extLst>
             <a:ext uri="{C572A759-6A51-4108-AA02-DFA0A04FC94B}">
-              <ma14:wrappingTextBoxFlag xmlns="" xmlns:m="http://schemas.openxmlformats.org/officeDocument/2006/math" xmlns:a14="http://schemas.microsoft.com/office/drawing/2010/main" xmlns:ma14="http://schemas.microsoft.com/office/mac/drawingml/2011/main" val="1"/>
+              <ma14:wrappingTextBoxFlag xmlns:ma14="http://schemas.microsoft.com/office/mac/drawingml/2011/main" xmlns:a14="http://schemas.microsoft.com/office/drawing/2010/main" xmlns:m="http://schemas.openxmlformats.org/officeDocument/2006/math" xmlns="" val="1"/>
             </a:ext>
           </a:extLst>
         </p:spPr>
@@ -13889,7 +13904,7 @@
           </a:ln>
           <a:extLst>
             <a:ext uri="{C572A759-6A51-4108-AA02-DFA0A04FC94B}">
-              <ma14:wrappingTextBoxFlag xmlns="" xmlns:m="http://schemas.openxmlformats.org/officeDocument/2006/math" xmlns:a14="http://schemas.microsoft.com/office/drawing/2010/main" xmlns:ma14="http://schemas.microsoft.com/office/mac/drawingml/2011/main" val="1"/>
+              <ma14:wrappingTextBoxFlag xmlns:ma14="http://schemas.microsoft.com/office/mac/drawingml/2011/main" xmlns:a14="http://schemas.microsoft.com/office/drawing/2010/main" xmlns:m="http://schemas.openxmlformats.org/officeDocument/2006/math" xmlns="" val="1"/>
             </a:ext>
           </a:extLst>
         </p:spPr>
@@ -13941,7 +13956,7 @@
           </a:ln>
           <a:extLst>
             <a:ext uri="{C572A759-6A51-4108-AA02-DFA0A04FC94B}">
-              <ma14:wrappingTextBoxFlag xmlns="" xmlns:m="http://schemas.openxmlformats.org/officeDocument/2006/math" xmlns:a14="http://schemas.microsoft.com/office/drawing/2010/main" xmlns:ma14="http://schemas.microsoft.com/office/mac/drawingml/2011/main" val="1"/>
+              <ma14:wrappingTextBoxFlag xmlns:ma14="http://schemas.microsoft.com/office/mac/drawingml/2011/main" xmlns:a14="http://schemas.microsoft.com/office/drawing/2010/main" xmlns:m="http://schemas.openxmlformats.org/officeDocument/2006/math" xmlns="" val="1"/>
             </a:ext>
           </a:extLst>
         </p:spPr>
@@ -14083,7 +14098,7 @@
           </a:ln>
           <a:extLst>
             <a:ext uri="{C572A759-6A51-4108-AA02-DFA0A04FC94B}">
-              <ma14:wrappingTextBoxFlag xmlns="" xmlns:m="http://schemas.openxmlformats.org/officeDocument/2006/math" xmlns:a14="http://schemas.microsoft.com/office/drawing/2010/main" xmlns:ma14="http://schemas.microsoft.com/office/mac/drawingml/2011/main" val="1"/>
+              <ma14:wrappingTextBoxFlag xmlns:ma14="http://schemas.microsoft.com/office/mac/drawingml/2011/main" xmlns:a14="http://schemas.microsoft.com/office/drawing/2010/main" xmlns:m="http://schemas.openxmlformats.org/officeDocument/2006/math" xmlns="" val="1"/>
             </a:ext>
           </a:extLst>
         </p:spPr>
@@ -14149,7 +14164,12 @@
             <p:ph type="title"/>
           </p:nvPr>
         </p:nvSpPr>
-        <p:spPr/>
+        <p:spPr>
+          <a:xfrm>
+            <a:off x="200053" y="267629"/>
+            <a:ext cx="2186308" cy="683941"/>
+          </a:xfrm>
+        </p:spPr>
         <p:txBody>
           <a:bodyPr/>
           <a:lstStyle/>
@@ -14551,6 +14571,11 @@
               <a:rPr sz="2400" dirty="0"/>
               <a:t>alk about the computational cost of an algorithm that focuses on the essential parts and ignores irrelevant details</a:t>
             </a:r>
+            <a:r>
+              <a:rPr lang="en-US" sz="2400" dirty="0"/>
+              <a:t>.</a:t>
+            </a:r>
+            <a:endParaRPr sz="2400" dirty="0"/>
           </a:p>
           <a:p>
             <a:pPr marL="0" indent="0">
@@ -14703,8 +14728,8 @@
         </p:nvSpPr>
         <p:spPr>
           <a:xfrm>
-            <a:off x="457200" y="1719262"/>
-            <a:ext cx="8229600" cy="4411663"/>
+            <a:off x="457200" y="1719263"/>
+            <a:ext cx="8229600" cy="3733684"/>
           </a:xfrm>
           <a:prstGeom prst="rect">
             <a:avLst/>
@@ -14729,6 +14754,11 @@
               <a:rPr sz="2400" dirty="0"/>
               <a:t>Precisely calculating the actual steps is tedious and not generally useful</a:t>
             </a:r>
+            <a:r>
+              <a:rPr lang="en-US" sz="2400" dirty="0"/>
+              <a:t>.</a:t>
+            </a:r>
+            <a:endParaRPr sz="2400" dirty="0"/>
           </a:p>
           <a:p>
             <a:pPr marL="0" indent="0">
@@ -14749,8 +14779,21 @@
             </a:pPr>
             <a:r>
               <a:rPr sz="2400" dirty="0"/>
-              <a:t>Different operations take different amounts of time.  Even from run to run, things such as caching, etc. cause variations</a:t>
-            </a:r>
+              <a:t>Different operations take different amounts of time.</a:t>
+            </a:r>
+            <a:r>
+              <a:rPr lang="en-US" sz="2400" dirty="0"/>
+              <a:t> </a:t>
+            </a:r>
+            <a:r>
+              <a:rPr sz="2400" dirty="0"/>
+              <a:t>Even from run to run, things such as caching, etc. cause variations</a:t>
+            </a:r>
+            <a:r>
+              <a:rPr lang="en-US" sz="2400" dirty="0"/>
+              <a:t>.</a:t>
+            </a:r>
+            <a:endParaRPr sz="2400" dirty="0"/>
           </a:p>
           <a:p>
             <a:pPr marL="0" indent="0">
@@ -14781,6 +14824,11 @@
               <a:rPr sz="2400" dirty="0"/>
               <a:t> of algorithmic runtimes</a:t>
             </a:r>
+            <a:r>
+              <a:rPr lang="en-US" sz="2400" dirty="0"/>
+              <a:t>.</a:t>
+            </a:r>
+            <a:endParaRPr sz="2400" dirty="0"/>
           </a:p>
         </p:txBody>
       </p:sp>
@@ -15442,7 +15490,7 @@
           </a:ln>
           <a:extLst>
             <a:ext uri="{C572A759-6A51-4108-AA02-DFA0A04FC94B}">
-              <ma14:wrappingTextBoxFlag xmlns="" xmlns:m="http://schemas.openxmlformats.org/officeDocument/2006/math" xmlns:a14="http://schemas.microsoft.com/office/drawing/2010/main" xmlns:ma14="http://schemas.microsoft.com/office/mac/drawingml/2011/main" val="1"/>
+              <ma14:wrappingTextBoxFlag xmlns:ma14="http://schemas.microsoft.com/office/mac/drawingml/2011/main" xmlns:a14="http://schemas.microsoft.com/office/drawing/2010/main" xmlns:m="http://schemas.openxmlformats.org/officeDocument/2006/math" xmlns="" val="1"/>
             </a:ext>
           </a:extLst>
         </p:spPr>
@@ -15792,7 +15840,7 @@
           </a:ln>
           <a:extLst>
             <a:ext uri="{C572A759-6A51-4108-AA02-DFA0A04FC94B}">
-              <ma14:wrappingTextBoxFlag xmlns="" xmlns:m="http://schemas.openxmlformats.org/officeDocument/2006/math" xmlns:a14="http://schemas.microsoft.com/office/drawing/2010/main" xmlns:ma14="http://schemas.microsoft.com/office/mac/drawingml/2011/main" val="1"/>
+              <ma14:wrappingTextBoxFlag xmlns:ma14="http://schemas.microsoft.com/office/mac/drawingml/2011/main" xmlns:a14="http://schemas.microsoft.com/office/drawing/2010/main" xmlns:m="http://schemas.openxmlformats.org/officeDocument/2006/math" xmlns="" val="1"/>
             </a:ext>
           </a:extLst>
         </p:spPr>
@@ -15908,7 +15956,7 @@
           </a:ln>
           <a:extLst>
             <a:ext uri="{C572A759-6A51-4108-AA02-DFA0A04FC94B}">
-              <ma14:wrappingTextBoxFlag xmlns="" xmlns:m="http://schemas.openxmlformats.org/officeDocument/2006/math" xmlns:a14="http://schemas.microsoft.com/office/drawing/2010/main" xmlns:ma14="http://schemas.microsoft.com/office/mac/drawingml/2011/main" val="1"/>
+              <ma14:wrappingTextBoxFlag xmlns:ma14="http://schemas.microsoft.com/office/mac/drawingml/2011/main" xmlns:a14="http://schemas.microsoft.com/office/drawing/2010/main" xmlns:m="http://schemas.openxmlformats.org/officeDocument/2006/math" xmlns="" val="1"/>
             </a:ext>
           </a:extLst>
         </p:spPr>
@@ -16330,7 +16378,7 @@
         <p:spPr>
           <a:xfrm>
             <a:off x="1569719" y="4267200"/>
-            <a:ext cx="6690362" cy="1487845"/>
+            <a:ext cx="6690362" cy="1569660"/>
           </a:xfrm>
           <a:prstGeom prst="rect">
             <a:avLst/>
@@ -16340,7 +16388,7 @@
           </a:ln>
           <a:extLst>
             <a:ext uri="{C572A759-6A51-4108-AA02-DFA0A04FC94B}">
-              <ma14:wrappingTextBoxFlag xmlns="" xmlns:m="http://schemas.openxmlformats.org/officeDocument/2006/math" xmlns:a14="http://schemas.microsoft.com/office/drawing/2010/main" xmlns:ma14="http://schemas.microsoft.com/office/mac/drawingml/2011/main" val="1"/>
+              <ma14:wrappingTextBoxFlag xmlns:ma14="http://schemas.microsoft.com/office/mac/drawingml/2011/main" xmlns:a14="http://schemas.microsoft.com/office/drawing/2010/main" xmlns:m="http://schemas.openxmlformats.org/officeDocument/2006/math" xmlns="" val="1"/>
             </a:ext>
           </a:extLst>
         </p:spPr>
@@ -16361,8 +16409,14 @@
               </a:defRPr>
             </a:pPr>
             <a:r>
+              <a:rPr dirty="0"/>
               <a:t>Generally, we’re most interested in big O notation since it is an upper bound on the running time</a:t>
             </a:r>
+            <a:r>
+              <a:rPr lang="en-US" dirty="0"/>
+              <a:t>.</a:t>
+            </a:r>
+            <a:endParaRPr dirty="0"/>
           </a:p>
         </p:txBody>
       </p:sp>
@@ -16789,7 +16843,7 @@
           </a:ln>
           <a:extLst>
             <a:ext uri="{C572A759-6A51-4108-AA02-DFA0A04FC94B}">
-              <ma14:wrappingTextBoxFlag xmlns="" xmlns:m="http://schemas.openxmlformats.org/officeDocument/2006/math" xmlns:a14="http://schemas.microsoft.com/office/drawing/2010/main" xmlns:ma14="http://schemas.microsoft.com/office/mac/drawingml/2011/main" val="1"/>
+              <ma14:wrappingTextBoxFlag xmlns:ma14="http://schemas.microsoft.com/office/mac/drawingml/2011/main" xmlns:a14="http://schemas.microsoft.com/office/drawing/2010/main" xmlns:m="http://schemas.openxmlformats.org/officeDocument/2006/math" xmlns="" val="1"/>
             </a:ext>
           </a:extLst>
         </p:spPr>
@@ -17293,7 +17347,7 @@
         <p:spPr>
           <a:xfrm>
             <a:off x="2407919" y="4190999"/>
-            <a:ext cx="3337562" cy="1150763"/>
+            <a:ext cx="3337562" cy="1200329"/>
           </a:xfrm>
           <a:prstGeom prst="rect">
             <a:avLst/>
@@ -17303,7 +17357,7 @@
           </a:ln>
           <a:extLst>
             <a:ext uri="{C572A759-6A51-4108-AA02-DFA0A04FC94B}">
-              <ma14:wrappingTextBoxFlag xmlns="" xmlns:m="http://schemas.openxmlformats.org/officeDocument/2006/math" xmlns:a14="http://schemas.microsoft.com/office/drawing/2010/main" xmlns:ma14="http://schemas.microsoft.com/office/mac/drawingml/2011/main" val="1"/>
+              <ma14:wrappingTextBoxFlag xmlns:ma14="http://schemas.microsoft.com/office/mac/drawingml/2011/main" xmlns:a14="http://schemas.microsoft.com/office/drawing/2010/main" xmlns:m="http://schemas.openxmlformats.org/officeDocument/2006/math" xmlns="" val="1"/>
             </a:ext>
           </a:extLst>
         </p:spPr>
@@ -17320,29 +17374,38 @@
               <a:defRPr sz="1800"/>
             </a:pPr>
             <a:r>
+              <a:rPr dirty="0"/>
               <a:t>We can bound the function </a:t>
             </a:r>
             <a:r>
-              <a:rPr i="1"/>
+              <a:rPr i="1" dirty="0"/>
               <a:t>f(n)</a:t>
             </a:r>
             <a:r>
+              <a:rPr dirty="0"/>
               <a:t> above </a:t>
             </a:r>
             <a:r>
-              <a:rPr b="1"/>
+              <a:rPr b="1" dirty="0"/>
               <a:t>and</a:t>
             </a:r>
             <a:r>
+              <a:rPr dirty="0"/>
               <a:t> below by some constant factor of </a:t>
             </a:r>
             <a:r>
-              <a:rPr i="1"/>
+              <a:rPr i="1" dirty="0"/>
               <a:t>g(n)</a:t>
             </a:r>
             <a:r>
+              <a:rPr dirty="0"/>
               <a:t> (though different constants)</a:t>
             </a:r>
+            <a:r>
+              <a:rPr lang="en-US" dirty="0"/>
+              <a:t>.</a:t>
+            </a:r>
+            <a:endParaRPr dirty="0"/>
           </a:p>
         </p:txBody>
       </p:sp>
@@ -17548,10 +17611,15 @@
               <a:defRPr i="1"/>
             </a:pPr>
             <a:r>
-              <a:t>Θ(g(n))</a:t>
-            </a:r>
-            <a:r>
-              <a:rPr i="0"/>
+              <a:rPr dirty="0" err="1"/>
+              <a:t>Θ</a:t>
+            </a:r>
+            <a:r>
+              <a:rPr dirty="0"/>
+              <a:t>(g(n))</a:t>
+            </a:r>
+            <a:r>
+              <a:rPr i="0" dirty="0"/>
               <a:t> is the set of functions:</a:t>
             </a:r>
           </a:p>
@@ -17593,7 +17661,7 @@
         <p:spPr>
           <a:xfrm>
             <a:off x="579119" y="4267200"/>
-            <a:ext cx="8138162" cy="892607"/>
+            <a:ext cx="8138162" cy="954107"/>
           </a:xfrm>
           <a:prstGeom prst="rect">
             <a:avLst/>
@@ -17603,7 +17671,7 @@
           </a:ln>
           <a:extLst>
             <a:ext uri="{C572A759-6A51-4108-AA02-DFA0A04FC94B}">
-              <ma14:wrappingTextBoxFlag xmlns="" xmlns:m="http://schemas.openxmlformats.org/officeDocument/2006/math" xmlns:a14="http://schemas.microsoft.com/office/drawing/2010/main" xmlns:ma14="http://schemas.microsoft.com/office/mac/drawingml/2011/main" val="1"/>
+              <ma14:wrappingTextBoxFlag xmlns:ma14="http://schemas.microsoft.com/office/mac/drawingml/2011/main" xmlns:a14="http://schemas.microsoft.com/office/drawing/2010/main" xmlns:m="http://schemas.openxmlformats.org/officeDocument/2006/math" xmlns="" val="1"/>
             </a:ext>
           </a:extLst>
         </p:spPr>
@@ -17620,15 +17688,34 @@
               <a:defRPr sz="2800"/>
             </a:pPr>
             <a:r>
-              <a:t>Note:  A function is theta bounded </a:t>
-            </a:r>
-            <a:r>
-              <a:rPr b="1"/>
+              <a:rPr b="1" dirty="0"/>
+              <a:t>Note</a:t>
+            </a:r>
+            <a:r>
+              <a:rPr dirty="0"/>
+              <a:t>:</a:t>
+            </a:r>
+            <a:r>
+              <a:rPr lang="en-US" dirty="0"/>
+              <a:t> </a:t>
+            </a:r>
+            <a:r>
+              <a:rPr dirty="0"/>
+              <a:t>A function is theta bounded </a:t>
+            </a:r>
+            <a:r>
+              <a:rPr b="1" dirty="0" err="1"/>
               <a:t>iff</a:t>
             </a:r>
             <a:r>
+              <a:rPr dirty="0"/>
               <a:t> it is big O bounded and Omega bounded</a:t>
             </a:r>
+            <a:r>
+              <a:rPr lang="en-US" dirty="0"/>
+              <a:t>.</a:t>
+            </a:r>
+            <a:endParaRPr dirty="0"/>
           </a:p>
         </p:txBody>
       </p:sp>
@@ -18042,7 +18129,7 @@
           </a:ln>
           <a:extLst>
             <a:ext uri="{C572A759-6A51-4108-AA02-DFA0A04FC94B}">
-              <ma14:wrappingTextBoxFlag xmlns="" xmlns:m="http://schemas.openxmlformats.org/officeDocument/2006/math" xmlns:a14="http://schemas.microsoft.com/office/drawing/2010/main" xmlns:ma14="http://schemas.microsoft.com/office/mac/drawingml/2011/main" val="1"/>
+              <ma14:wrappingTextBoxFlag xmlns:ma14="http://schemas.microsoft.com/office/mac/drawingml/2011/main" xmlns:a14="http://schemas.microsoft.com/office/drawing/2010/main" xmlns:m="http://schemas.openxmlformats.org/officeDocument/2006/math" xmlns="" val="1"/>
             </a:ext>
           </a:extLst>
         </p:spPr>
@@ -18295,7 +18382,7 @@
           </a:ln>
           <a:extLst>
             <a:ext uri="{C572A759-6A51-4108-AA02-DFA0A04FC94B}">
-              <ma14:wrappingTextBoxFlag xmlns="" xmlns:m="http://schemas.openxmlformats.org/officeDocument/2006/math" xmlns:a14="http://schemas.microsoft.com/office/drawing/2010/main" xmlns:ma14="http://schemas.microsoft.com/office/mac/drawingml/2011/main" val="1"/>
+              <ma14:wrappingTextBoxFlag xmlns:ma14="http://schemas.microsoft.com/office/mac/drawingml/2011/main" xmlns:a14="http://schemas.microsoft.com/office/drawing/2010/main" xmlns:m="http://schemas.openxmlformats.org/officeDocument/2006/math" xmlns="" val="1"/>
             </a:ext>
           </a:extLst>
         </p:spPr>
@@ -18340,7 +18427,7 @@
           </a:ln>
           <a:extLst>
             <a:ext uri="{C572A759-6A51-4108-AA02-DFA0A04FC94B}">
-              <ma14:wrappingTextBoxFlag xmlns="" xmlns:m="http://schemas.openxmlformats.org/officeDocument/2006/math" xmlns:a14="http://schemas.microsoft.com/office/drawing/2010/main" xmlns:ma14="http://schemas.microsoft.com/office/mac/drawingml/2011/main" val="1"/>
+              <ma14:wrappingTextBoxFlag xmlns:ma14="http://schemas.microsoft.com/office/mac/drawingml/2011/main" xmlns:a14="http://schemas.microsoft.com/office/drawing/2010/main" xmlns:m="http://schemas.openxmlformats.org/officeDocument/2006/math" xmlns="" val="1"/>
             </a:ext>
           </a:extLst>
         </p:spPr>
@@ -18621,7 +18708,7 @@
           </a:ln>
           <a:extLst>
             <a:ext uri="{C572A759-6A51-4108-AA02-DFA0A04FC94B}">
-              <ma14:wrappingTextBoxFlag xmlns="" xmlns:m="http://schemas.openxmlformats.org/officeDocument/2006/math" xmlns:a14="http://schemas.microsoft.com/office/drawing/2010/main" xmlns:ma14="http://schemas.microsoft.com/office/mac/drawingml/2011/main" val="1"/>
+              <ma14:wrappingTextBoxFlag xmlns:ma14="http://schemas.microsoft.com/office/mac/drawingml/2011/main" xmlns:a14="http://schemas.microsoft.com/office/drawing/2010/main" xmlns:m="http://schemas.openxmlformats.org/officeDocument/2006/math" xmlns="" val="1"/>
             </a:ext>
           </a:extLst>
         </p:spPr>
@@ -18666,7 +18753,7 @@
           </a:ln>
           <a:extLst>
             <a:ext uri="{C572A759-6A51-4108-AA02-DFA0A04FC94B}">
-              <ma14:wrappingTextBoxFlag xmlns="" xmlns:m="http://schemas.openxmlformats.org/officeDocument/2006/math" xmlns:a14="http://schemas.microsoft.com/office/drawing/2010/main" xmlns:ma14="http://schemas.microsoft.com/office/mac/drawingml/2011/main" val="1"/>
+              <ma14:wrappingTextBoxFlag xmlns:ma14="http://schemas.microsoft.com/office/mac/drawingml/2011/main" xmlns:a14="http://schemas.microsoft.com/office/drawing/2010/main" xmlns:m="http://schemas.openxmlformats.org/officeDocument/2006/math" xmlns="" val="1"/>
             </a:ext>
           </a:extLst>
         </p:spPr>
@@ -18769,7 +18856,7 @@
         <p:spPr>
           <a:xfrm>
             <a:off x="381000" y="1684337"/>
-            <a:ext cx="8229600" cy="4411663"/>
+            <a:ext cx="8229600" cy="3144141"/>
           </a:xfrm>
           <a:prstGeom prst="rect">
             <a:avLst/>
@@ -18882,7 +18969,7 @@
             </a:r>
             <a:r>
               <a:rPr lang="en-US" sz="2000" i="0" dirty="0"/>
-              <a:t> (Sometimes can think about this as any data or random data)</a:t>
+              <a:t> (Sometimes can think about this as any data or random data.)</a:t>
             </a:r>
             <a:br>
               <a:rPr sz="2000" i="0" dirty="0"/>
@@ -18931,6 +19018,11 @@
               <a:rPr sz="2000" b="0" dirty="0"/>
               <a:t>, asymptotic notation is about bounding particular situations</a:t>
             </a:r>
+            <a:r>
+              <a:rPr lang="en-US" sz="2000" b="0" dirty="0"/>
+              <a:t>.</a:t>
+            </a:r>
+            <a:endParaRPr sz="2000" b="0" dirty="0"/>
           </a:p>
         </p:txBody>
       </p:sp>
@@ -19291,6 +19383,7 @@
               <a:defRPr sz="2400"/>
             </a:pPr>
             <a:r>
+              <a:rPr dirty="0"/>
               <a:t>Multiplicative constants can be omitted</a:t>
             </a:r>
           </a:p>
@@ -19308,21 +19401,23 @@
               <a:defRPr sz="2000" i="1"/>
             </a:pPr>
             <a:r>
+              <a:rPr dirty="0"/>
               <a:t>14n</a:t>
             </a:r>
             <a:r>
-              <a:rPr baseline="30000"/>
+              <a:rPr baseline="30000" dirty="0"/>
               <a:t>2</a:t>
             </a:r>
             <a:r>
-              <a:rPr i="0"/>
+              <a:rPr i="0" dirty="0"/>
               <a:t> becomes </a:t>
             </a:r>
             <a:r>
+              <a:rPr dirty="0"/>
               <a:t>n</a:t>
             </a:r>
             <a:r>
-              <a:rPr baseline="30000"/>
+              <a:rPr baseline="30000" dirty="0"/>
               <a:t>2</a:t>
             </a:r>
           </a:p>
@@ -19340,17 +19435,19 @@
               <a:defRPr sz="2000"/>
             </a:pPr>
             <a:r>
+              <a:rPr dirty="0"/>
               <a:t>7 log </a:t>
             </a:r>
             <a:r>
-              <a:rPr i="1"/>
+              <a:rPr i="1" dirty="0"/>
               <a:t>n</a:t>
             </a:r>
             <a:r>
+              <a:rPr dirty="0"/>
               <a:t> become log </a:t>
             </a:r>
             <a:r>
-              <a:rPr i="1"/>
+              <a:rPr i="1" dirty="0"/>
               <a:t>n</a:t>
             </a:r>
           </a:p>
@@ -19364,7 +19461,7 @@
               <a:buNone/>
               <a:defRPr sz="2400"/>
             </a:pPr>
-            <a:endParaRPr i="1"/>
+            <a:endParaRPr i="1" dirty="0"/>
           </a:p>
           <a:p>
             <a:pPr marL="0" indent="0">
@@ -19380,6 +19477,7 @@
               <a:defRPr sz="2400"/>
             </a:pPr>
             <a:r>
+              <a:rPr dirty="0"/>
               <a:t>Lower order functions can be omitted</a:t>
             </a:r>
           </a:p>
@@ -19397,13 +19495,15 @@
               <a:defRPr sz="2000" i="1"/>
             </a:pPr>
             <a:r>
+              <a:rPr dirty="0"/>
               <a:t>n</a:t>
             </a:r>
             <a:r>
-              <a:rPr i="0"/>
+              <a:rPr i="0" dirty="0"/>
               <a:t> + 5 becomes </a:t>
             </a:r>
             <a:r>
+              <a:rPr dirty="0"/>
               <a:t>n</a:t>
             </a:r>
           </a:p>
@@ -19421,24 +19521,27 @@
               <a:defRPr sz="2000" i="1"/>
             </a:pPr>
             <a:r>
+              <a:rPr dirty="0"/>
               <a:t>n</a:t>
             </a:r>
             <a:r>
-              <a:rPr baseline="30000"/>
+              <a:rPr baseline="30000" dirty="0"/>
               <a:t>2</a:t>
             </a:r>
             <a:r>
+              <a:rPr dirty="0"/>
               <a:t> + n</a:t>
             </a:r>
             <a:r>
-              <a:rPr i="0"/>
+              <a:rPr i="0" dirty="0"/>
               <a:t> becomes </a:t>
             </a:r>
             <a:r>
+              <a:rPr dirty="0"/>
               <a:t>n</a:t>
             </a:r>
             <a:r>
-              <a:rPr baseline="30000"/>
+              <a:rPr baseline="30000" dirty="0"/>
               <a:t>2</a:t>
             </a:r>
           </a:p>
@@ -19452,7 +19555,7 @@
               <a:buNone/>
               <a:defRPr sz="2400" i="1"/>
             </a:pPr>
-            <a:endParaRPr baseline="30000"/>
+            <a:endParaRPr baseline="30000" dirty="0"/>
           </a:p>
           <a:p>
             <a:pPr marL="0" indent="0">
@@ -19468,39 +19571,43 @@
               <a:defRPr sz="2400" i="1"/>
             </a:pPr>
             <a:r>
+              <a:rPr dirty="0" err="1"/>
               <a:t>n</a:t>
             </a:r>
             <a:r>
-              <a:rPr baseline="30000"/>
+              <a:rPr baseline="30000" dirty="0" err="1"/>
               <a:t>a</a:t>
             </a:r>
             <a:r>
-              <a:rPr i="0"/>
+              <a:rPr i="0" dirty="0"/>
               <a:t> dominates </a:t>
             </a:r>
             <a:r>
+              <a:rPr dirty="0" err="1"/>
               <a:t>n</a:t>
             </a:r>
             <a:r>
-              <a:rPr baseline="30000"/>
+              <a:rPr baseline="30000" dirty="0" err="1"/>
               <a:t>b</a:t>
             </a:r>
             <a:r>
-              <a:rPr i="0"/>
+              <a:rPr i="0" dirty="0"/>
               <a:t> if </a:t>
             </a:r>
             <a:r>
+              <a:rPr dirty="0"/>
               <a:t>a</a:t>
             </a:r>
             <a:r>
-              <a:rPr i="0"/>
+              <a:rPr i="0" dirty="0"/>
               <a:t> &gt; </a:t>
             </a:r>
             <a:r>
+              <a:rPr dirty="0"/>
               <a:t>b</a:t>
             </a:r>
             <a:r>
-              <a:rPr i="0"/>
+              <a:rPr i="0" dirty="0"/>
               <a:t> </a:t>
             </a:r>
           </a:p>
@@ -19518,45 +19625,51 @@
               <a:defRPr sz="2000" i="1"/>
             </a:pPr>
             <a:r>
+              <a:rPr dirty="0"/>
               <a:t>n</a:t>
             </a:r>
             <a:r>
-              <a:rPr baseline="30000"/>
+              <a:rPr baseline="30000" dirty="0"/>
               <a:t>2</a:t>
             </a:r>
             <a:r>
+              <a:rPr dirty="0"/>
               <a:t> </a:t>
             </a:r>
             <a:r>
-              <a:rPr i="0"/>
+              <a:rPr i="0" dirty="0"/>
               <a:t>dominates </a:t>
             </a:r>
             <a:r>
+              <a:rPr dirty="0"/>
               <a:t>n</a:t>
             </a:r>
             <a:r>
-              <a:rPr i="0"/>
+              <a:rPr i="0" dirty="0"/>
               <a:t>, so </a:t>
             </a:r>
             <a:r>
+              <a:rPr dirty="0"/>
               <a:t>n</a:t>
             </a:r>
             <a:r>
-              <a:rPr baseline="30000"/>
+              <a:rPr baseline="30000" dirty="0"/>
               <a:t>2</a:t>
             </a:r>
             <a:r>
+              <a:rPr dirty="0"/>
               <a:t>+n</a:t>
             </a:r>
             <a:r>
-              <a:rPr i="0"/>
+              <a:rPr i="0" dirty="0"/>
               <a:t> becomes </a:t>
             </a:r>
             <a:r>
+              <a:rPr dirty="0"/>
               <a:t>n</a:t>
             </a:r>
             <a:r>
-              <a:rPr baseline="30000"/>
+              <a:rPr baseline="30000" dirty="0"/>
               <a:t>2</a:t>
             </a:r>
           </a:p>
@@ -19574,21 +19687,23 @@
               <a:defRPr sz="2000" i="1"/>
             </a:pPr>
             <a:r>
+              <a:rPr dirty="0"/>
               <a:t>n</a:t>
             </a:r>
             <a:r>
-              <a:rPr baseline="30000"/>
+              <a:rPr baseline="30000" dirty="0"/>
               <a:t>1.5</a:t>
             </a:r>
             <a:r>
-              <a:rPr i="0"/>
+              <a:rPr i="0" dirty="0"/>
               <a:t> dominates </a:t>
             </a:r>
             <a:r>
+              <a:rPr dirty="0"/>
               <a:t>n</a:t>
             </a:r>
             <a:r>
-              <a:rPr baseline="30000"/>
+              <a:rPr baseline="30000" dirty="0"/>
               <a:t>1.4</a:t>
             </a:r>
           </a:p>
@@ -20162,13 +20277,15 @@
               <a:defRPr sz="3400"/>
             </a:pPr>
             <a:r>
+              <a:rPr dirty="0"/>
               <a:t>n</a:t>
             </a:r>
             <a:r>
-              <a:rPr baseline="30000"/>
+              <a:rPr baseline="30000" dirty="0"/>
               <a:t>2</a:t>
             </a:r>
             <a:r>
+              <a:rPr dirty="0"/>
               <a:t> + n log n + 50</a:t>
             </a:r>
           </a:p>
@@ -20177,7 +20294,7 @@
               <a:buChar char="●"/>
               <a:defRPr sz="3400"/>
             </a:pPr>
-            <a:endParaRPr/>
+            <a:endParaRPr dirty="0"/>
           </a:p>
           <a:p>
             <a:pPr marL="0" indent="0">
@@ -20190,27 +20307,31 @@
               <a:defRPr sz="3400"/>
             </a:pPr>
             <a:r>
+              <a:rPr dirty="0"/>
               <a:t>2</a:t>
             </a:r>
             <a:r>
-              <a:rPr baseline="30000"/>
+              <a:rPr baseline="30000" dirty="0"/>
               <a:t>n </a:t>
             </a:r>
             <a:r>
+              <a:rPr dirty="0"/>
               <a:t>-15n</a:t>
             </a:r>
             <a:r>
-              <a:rPr baseline="30000"/>
+              <a:rPr baseline="30000" dirty="0"/>
               <a:t>2 </a:t>
             </a:r>
             <a:r>
+              <a:rPr dirty="0"/>
               <a:t>+ n</a:t>
             </a:r>
             <a:r>
-              <a:rPr baseline="30000"/>
+              <a:rPr baseline="30000" dirty="0"/>
               <a:t>3 </a:t>
             </a:r>
             <a:r>
+              <a:rPr dirty="0"/>
               <a:t>log n</a:t>
             </a:r>
           </a:p>
@@ -20219,7 +20340,7 @@
               <a:buChar char="●"/>
               <a:defRPr sz="3400"/>
             </a:pPr>
-            <a:endParaRPr/>
+            <a:endParaRPr dirty="0"/>
           </a:p>
           <a:p>
             <a:pPr marL="0" indent="0">
@@ -20232,24 +20353,31 @@
               <a:defRPr sz="3400"/>
             </a:pPr>
             <a:r>
+              <a:rPr dirty="0" err="1"/>
               <a:t>n</a:t>
             </a:r>
             <a:r>
-              <a:rPr baseline="30000"/>
-              <a:t>log n</a:t>
-            </a:r>
-            <a:r>
+              <a:rPr baseline="30000" dirty="0" err="1"/>
+              <a:t>log</a:t>
+            </a:r>
+            <a:r>
+              <a:rPr baseline="30000" dirty="0"/>
+              <a:t> n</a:t>
+            </a:r>
+            <a:r>
+              <a:rPr dirty="0"/>
               <a:t> + n</a:t>
             </a:r>
             <a:r>
-              <a:rPr baseline="30000"/>
+              <a:rPr baseline="30000" dirty="0"/>
               <a:t>2</a:t>
             </a:r>
             <a:r>
+              <a:rPr dirty="0"/>
               <a:t> + 15n</a:t>
             </a:r>
             <a:r>
-              <a:rPr baseline="30000"/>
+              <a:rPr baseline="30000" dirty="0"/>
               <a:t>3</a:t>
             </a:r>
           </a:p>
@@ -20258,7 +20386,7 @@
               <a:buChar char="●"/>
               <a:defRPr sz="3400"/>
             </a:pPr>
-            <a:endParaRPr baseline="30000"/>
+            <a:endParaRPr baseline="30000" dirty="0"/>
           </a:p>
           <a:p>
             <a:pPr marL="0" indent="0">
@@ -20271,19 +20399,26 @@
               <a:defRPr sz="3400"/>
             </a:pPr>
             <a:r>
+              <a:rPr dirty="0"/>
               <a:t>n</a:t>
             </a:r>
             <a:r>
-              <a:rPr baseline="30000"/>
+              <a:rPr baseline="30000" dirty="0"/>
               <a:t>5 </a:t>
             </a:r>
             <a:r>
-              <a:t>+ n! + n</a:t>
-            </a:r>
-            <a:r>
-              <a:rPr baseline="30000"/>
+              <a:rPr dirty="0"/>
+              <a:t>+ n! + </a:t>
+            </a:r>
+            <a:r>
+              <a:rPr dirty="0" err="1"/>
               <a:t>n</a:t>
             </a:r>
+            <a:r>
+              <a:rPr baseline="30000" dirty="0" err="1"/>
+              <a:t>n</a:t>
+            </a:r>
+            <a:endParaRPr baseline="30000" dirty="0"/>
           </a:p>
         </p:txBody>
       </p:sp>
@@ -20390,7 +20525,7 @@
           </a:ln>
           <a:extLst>
             <a:ext uri="{C572A759-6A51-4108-AA02-DFA0A04FC94B}">
-              <ma14:wrappingTextBoxFlag xmlns="" xmlns:m="http://schemas.openxmlformats.org/officeDocument/2006/math" xmlns:a14="http://schemas.microsoft.com/office/drawing/2010/main" xmlns:ma14="http://schemas.microsoft.com/office/mac/drawingml/2011/main" val="1"/>
+              <ma14:wrappingTextBoxFlag xmlns:ma14="http://schemas.microsoft.com/office/mac/drawingml/2011/main" xmlns:a14="http://schemas.microsoft.com/office/drawing/2010/main" xmlns:m="http://schemas.openxmlformats.org/officeDocument/2006/math" xmlns="" val="1"/>
             </a:ext>
           </a:extLst>
         </p:spPr>
@@ -20522,7 +20657,7 @@
           </a:ln>
           <a:extLst>
             <a:ext uri="{C572A759-6A51-4108-AA02-DFA0A04FC94B}">
-              <ma14:wrappingTextBoxFlag xmlns="" xmlns:m="http://schemas.openxmlformats.org/officeDocument/2006/math" xmlns:a14="http://schemas.microsoft.com/office/drawing/2010/main" xmlns:ma14="http://schemas.microsoft.com/office/mac/drawingml/2011/main" val="1"/>
+              <ma14:wrappingTextBoxFlag xmlns:ma14="http://schemas.microsoft.com/office/mac/drawingml/2011/main" xmlns:a14="http://schemas.microsoft.com/office/drawing/2010/main" xmlns:m="http://schemas.openxmlformats.org/officeDocument/2006/math" xmlns="" val="1"/>
             </a:ext>
           </a:extLst>
         </p:spPr>
@@ -20658,8 +20793,8 @@
           </a:ln>
         </p:spPr>
       </p:pic>
-      <mc:AlternateContent xmlns:mc="http://schemas.openxmlformats.org/markup-compatibility/2006" xmlns:a14="http://schemas.microsoft.com/office/drawing/2010/main">
-        <mc:Choice Requires="a14">
+      <mc:AlternateContent xmlns:mc="http://schemas.openxmlformats.org/markup-compatibility/2006">
+        <mc:Choice xmlns:a14="http://schemas.microsoft.com/office/drawing/2010/main" Requires="a14">
           <p:sp>
             <p:nvSpPr>
               <p:cNvPr id="128" name="How long will it take to run?"/>
@@ -20668,7 +20803,7 @@
             </p:nvSpPr>
             <p:spPr>
               <a:xfrm>
-                <a:off x="306805" y="3500762"/>
+                <a:off x="1092820" y="3978734"/>
                 <a:ext cx="3931972" cy="523220"/>
               </a:xfrm>
               <a:prstGeom prst="rect">
@@ -20679,7 +20814,7 @@
               </a:ln>
               <a:extLst>
                 <a:ext uri="{C572A759-6A51-4108-AA02-DFA0A04FC94B}">
-                  <ma14:wrappingTextBoxFlag xmlns="" xmlns:m="http://schemas.openxmlformats.org/officeDocument/2006/math" xmlns:ma14="http://schemas.microsoft.com/office/mac/drawingml/2011/main" val="1"/>
+                  <ma14:wrappingTextBoxFlag xmlns:ma14="http://schemas.microsoft.com/office/mac/drawingml/2011/main" xmlns:m="http://schemas.openxmlformats.org/officeDocument/2006/math" xmlns="" val="1"/>
                 </a:ext>
               </a:extLst>
             </p:spPr>
@@ -20765,7 +20900,7 @@
             </p:txBody>
           </p:sp>
         </mc:Choice>
-        <mc:Fallback xmlns="">
+        <mc:Fallback>
           <p:sp>
             <p:nvSpPr>
               <p:cNvPr id="128" name="How long will it take to run?"/>
@@ -20776,7 +20911,7 @@
             </p:nvSpPr>
             <p:spPr>
               <a:xfrm>
-                <a:off x="306805" y="3500762"/>
+                <a:off x="1092820" y="3978734"/>
                 <a:ext cx="3931972" cy="523220"/>
               </a:xfrm>
               <a:prstGeom prst="rect">
@@ -20785,7 +20920,7 @@
               <a:blipFill>
                 <a:blip r:embed="rId3"/>
                 <a:stretch>
-                  <a:fillRect l="-4516" t="-11905" b="-30952"/>
+                  <a:fillRect l="-4180" t="-11905" b="-30952"/>
                 </a:stretch>
               </a:blipFill>
               <a:ln w="12700">
@@ -20793,7 +20928,7 @@
               </a:ln>
               <a:extLst>
                 <a:ext uri="{C572A759-6A51-4108-AA02-DFA0A04FC94B}">
-                  <ma14:wrappingTextBoxFlag xmlns="" xmlns:m="http://schemas.openxmlformats.org/officeDocument/2006/math" xmlns:a14="http://schemas.microsoft.com/office/drawing/2010/main" xmlns:ma14="http://schemas.microsoft.com/office/mac/drawingml/2011/main" val="1"/>
+                  <ma14:wrappingTextBoxFlag xmlns:ma14="http://schemas.microsoft.com/office/mac/drawingml/2011/main" xmlns:m="http://schemas.openxmlformats.org/officeDocument/2006/math" xmlns="" xmlns:a14="http://schemas.microsoft.com/office/drawing/2010/main" val="1"/>
                 </a:ext>
               </a:extLst>
             </p:spPr>
@@ -20812,8 +20947,8 @@
           </p:sp>
         </mc:Fallback>
       </mc:AlternateContent>
-      <mc:AlternateContent xmlns:mc="http://schemas.openxmlformats.org/markup-compatibility/2006" xmlns:a14="http://schemas.microsoft.com/office/drawing/2010/main">
-        <mc:Choice Requires="a14">
+      <mc:AlternateContent xmlns:mc="http://schemas.openxmlformats.org/markup-compatibility/2006">
+        <mc:Choice xmlns:a14="http://schemas.microsoft.com/office/drawing/2010/main" Requires="a14">
           <p:sp>
             <p:nvSpPr>
               <p:cNvPr id="2" name="How long will it take to run?">
@@ -20828,7 +20963,7 @@
             </p:nvSpPr>
             <p:spPr>
               <a:xfrm>
-                <a:off x="306805" y="4301232"/>
+                <a:off x="1092820" y="4501954"/>
                 <a:ext cx="5616279" cy="523220"/>
               </a:xfrm>
               <a:prstGeom prst="rect">
@@ -20839,7 +20974,7 @@
               </a:ln>
               <a:extLst>
                 <a:ext uri="{C572A759-6A51-4108-AA02-DFA0A04FC94B}">
-                  <ma14:wrappingTextBoxFlag xmlns="" xmlns:m="http://schemas.openxmlformats.org/officeDocument/2006/math" xmlns:ma14="http://schemas.microsoft.com/office/mac/drawingml/2011/main" val="1"/>
+                  <ma14:wrappingTextBoxFlag xmlns:ma14="http://schemas.microsoft.com/office/mac/drawingml/2011/main" xmlns:m="http://schemas.openxmlformats.org/officeDocument/2006/math" xmlns="" val="1"/>
                 </a:ext>
               </a:extLst>
             </p:spPr>
@@ -20934,7 +21069,7 @@
             </p:txBody>
           </p:sp>
         </mc:Choice>
-        <mc:Fallback xmlns="">
+        <mc:Fallback>
           <p:sp>
             <p:nvSpPr>
               <p:cNvPr id="2" name="How long will it take to run?">
@@ -20951,7 +21086,7 @@
             </p:nvSpPr>
             <p:spPr>
               <a:xfrm>
-                <a:off x="306805" y="4301232"/>
+                <a:off x="1092820" y="4501954"/>
                 <a:ext cx="5616279" cy="523220"/>
               </a:xfrm>
               <a:prstGeom prst="rect">
@@ -20960,7 +21095,7 @@
               <a:blipFill>
                 <a:blip r:embed="rId4"/>
                 <a:stretch>
-                  <a:fillRect l="-3160" t="-11905" b="-30952"/>
+                  <a:fillRect l="-2928" t="-11905" b="-30952"/>
                 </a:stretch>
               </a:blipFill>
               <a:ln w="12700">
@@ -20968,7 +21103,7 @@
               </a:ln>
               <a:extLst>
                 <a:ext uri="{C572A759-6A51-4108-AA02-DFA0A04FC94B}">
-                  <ma14:wrappingTextBoxFlag xmlns="" xmlns:m="http://schemas.openxmlformats.org/officeDocument/2006/math" xmlns:a14="http://schemas.microsoft.com/office/drawing/2010/main" xmlns:ma14="http://schemas.microsoft.com/office/mac/drawingml/2011/main" val="1"/>
+                  <ma14:wrappingTextBoxFlag xmlns:ma14="http://schemas.microsoft.com/office/mac/drawingml/2011/main" xmlns:m="http://schemas.openxmlformats.org/officeDocument/2006/math" xmlns="" xmlns:a14="http://schemas.microsoft.com/office/drawing/2010/main" val="1"/>
                 </a:ext>
               </a:extLst>
             </p:spPr>
@@ -20987,8 +21122,8 @@
           </p:sp>
         </mc:Fallback>
       </mc:AlternateContent>
-      <mc:AlternateContent xmlns:mc="http://schemas.openxmlformats.org/markup-compatibility/2006" xmlns:a14="http://schemas.microsoft.com/office/drawing/2010/main">
-        <mc:Choice Requires="a14">
+      <mc:AlternateContent xmlns:mc="http://schemas.openxmlformats.org/markup-compatibility/2006">
+        <mc:Choice xmlns:a14="http://schemas.microsoft.com/office/drawing/2010/main" Requires="a14">
           <p:sp>
             <p:nvSpPr>
               <p:cNvPr id="3" name="How long will it take to run?">
@@ -21003,7 +21138,7 @@
             </p:nvSpPr>
             <p:spPr>
               <a:xfrm>
-                <a:off x="306805" y="5072390"/>
+                <a:off x="1092820" y="5025174"/>
                 <a:ext cx="2262797" cy="523220"/>
               </a:xfrm>
               <a:prstGeom prst="rect">
@@ -21014,7 +21149,7 @@
               </a:ln>
               <a:extLst>
                 <a:ext uri="{C572A759-6A51-4108-AA02-DFA0A04FC94B}">
-                  <ma14:wrappingTextBoxFlag xmlns="" xmlns:m="http://schemas.openxmlformats.org/officeDocument/2006/math" xmlns:ma14="http://schemas.microsoft.com/office/mac/drawingml/2011/main" val="1"/>
+                  <ma14:wrappingTextBoxFlag xmlns:ma14="http://schemas.microsoft.com/office/mac/drawingml/2011/main" xmlns:m="http://schemas.openxmlformats.org/officeDocument/2006/math" xmlns="" val="1"/>
                 </a:ext>
               </a:extLst>
             </p:spPr>
@@ -21033,7 +21168,7 @@
               </a:lstStyle>
               <a:p>
                 <a:r>
-                  <a:rPr lang="en-US" sz="2800">
+                  <a:rPr lang="en-US" sz="2800" dirty="0">
                     <a:solidFill>
                       <a:srgbClr val="0070C0"/>
                     </a:solidFill>
@@ -21109,7 +21244,7 @@
             </p:txBody>
           </p:sp>
         </mc:Choice>
-        <mc:Fallback xmlns="">
+        <mc:Fallback>
           <p:sp>
             <p:nvSpPr>
               <p:cNvPr id="3" name="How long will it take to run?">
@@ -21126,7 +21261,7 @@
             </p:nvSpPr>
             <p:spPr>
               <a:xfrm>
-                <a:off x="306805" y="5072390"/>
+                <a:off x="1092820" y="5025174"/>
                 <a:ext cx="2262797" cy="523220"/>
               </a:xfrm>
               <a:prstGeom prst="rect">
@@ -21135,7 +21270,7 @@
               <a:blipFill>
                 <a:blip r:embed="rId5"/>
                 <a:stretch>
-                  <a:fillRect l="-7821" t="-11905" b="-30952"/>
+                  <a:fillRect l="-7263" t="-11905" b="-30952"/>
                 </a:stretch>
               </a:blipFill>
               <a:ln w="12700">
@@ -21143,7 +21278,7 @@
               </a:ln>
               <a:extLst>
                 <a:ext uri="{C572A759-6A51-4108-AA02-DFA0A04FC94B}">
-                  <ma14:wrappingTextBoxFlag xmlns="" xmlns:m="http://schemas.openxmlformats.org/officeDocument/2006/math" xmlns:a14="http://schemas.microsoft.com/office/drawing/2010/main" xmlns:ma14="http://schemas.microsoft.com/office/mac/drawingml/2011/main" val="1"/>
+                  <ma14:wrappingTextBoxFlag xmlns:ma14="http://schemas.microsoft.com/office/mac/drawingml/2011/main" xmlns:m="http://schemas.openxmlformats.org/officeDocument/2006/math" xmlns="" xmlns:a14="http://schemas.microsoft.com/office/drawing/2010/main" val="1"/>
                 </a:ext>
               </a:extLst>
             </p:spPr>
@@ -21236,8 +21371,8 @@
         </p:nvSpPr>
         <p:spPr>
           <a:xfrm>
-            <a:off x="457200" y="1719262"/>
-            <a:ext cx="8229600" cy="4411663"/>
+            <a:off x="457200" y="1719263"/>
+            <a:ext cx="8229600" cy="3309938"/>
           </a:xfrm>
           <a:prstGeom prst="rect">
             <a:avLst/>
@@ -21256,6 +21391,11 @@
               <a:rPr sz="2400" dirty="0"/>
               <a:t>O(1) – constant.  Fixed amount of work, regardless of the input size</a:t>
             </a:r>
+            <a:r>
+              <a:rPr lang="en-US" sz="2400" dirty="0"/>
+              <a:t>.</a:t>
+            </a:r>
+            <a:endParaRPr sz="2400" dirty="0"/>
           </a:p>
           <a:p>
             <a:pPr marL="692150" lvl="1" indent="-347662">
@@ -21349,6 +21489,11 @@
               <a:rPr sz="2400" dirty="0"/>
               <a:t> half)</a:t>
             </a:r>
+            <a:r>
+              <a:rPr lang="en-US" sz="2400" dirty="0"/>
+              <a:t>.</a:t>
+            </a:r>
+            <a:endParaRPr sz="2400" dirty="0"/>
           </a:p>
           <a:p>
             <a:pPr marL="692150" lvl="1" indent="-347662">
@@ -21730,8 +21875,8 @@
         </p:nvSpPr>
         <p:spPr>
           <a:xfrm>
-            <a:off x="457200" y="1719262"/>
-            <a:ext cx="8229600" cy="4411663"/>
+            <a:off x="457200" y="1719263"/>
+            <a:ext cx="8229600" cy="3020006"/>
           </a:xfrm>
           <a:prstGeom prst="rect">
             <a:avLst/>
@@ -21758,6 +21903,11 @@
               <a:rPr sz="2400" dirty="0"/>
               <a:t>) – linear. Do a constant amount of work on each element of the input</a:t>
             </a:r>
+            <a:r>
+              <a:rPr lang="en-US" sz="2400" dirty="0"/>
+              <a:t>.</a:t>
+            </a:r>
+            <a:endParaRPr sz="2400" dirty="0"/>
           </a:p>
           <a:p>
             <a:pPr marL="692150" lvl="1" indent="-347662">
@@ -21811,8 +21961,21 @@
             </a:r>
             <a:r>
               <a:rPr sz="2400" dirty="0"/>
-              <a:t>) log-linear.  Divide and conquer algorithms with a linear amount of work to recombine</a:t>
-            </a:r>
+              <a:t>) log-linear.</a:t>
+            </a:r>
+            <a:r>
+              <a:rPr lang="en-US" sz="2400" dirty="0"/>
+              <a:t> </a:t>
+            </a:r>
+            <a:r>
+              <a:rPr sz="2400" dirty="0"/>
+              <a:t>Divide and conquer algorithms with a linear amount of work to recombine</a:t>
+            </a:r>
+            <a:r>
+              <a:rPr lang="en-US" sz="2400" dirty="0"/>
+              <a:t>.</a:t>
+            </a:r>
+            <a:endParaRPr sz="2400" dirty="0"/>
           </a:p>
           <a:p>
             <a:pPr marL="692150" lvl="1" indent="-347662">
@@ -21826,13 +21989,8 @@
             </a:pPr>
             <a:r>
               <a:rPr sz="2000" dirty="0"/>
-              <a:t>Sort a list of number with </a:t>
-            </a:r>
-            <a:r>
-              <a:rPr sz="2000" dirty="0" err="1"/>
-              <a:t>MergeSort</a:t>
-            </a:r>
-            <a:endParaRPr sz="2000" dirty="0"/>
+              <a:t>Sort a list of number with MergeSort</a:t>
+            </a:r>
           </a:p>
           <a:p>
             <a:pPr marL="692150" lvl="1" indent="-347662">

</xml_diff>